<commit_message>
Minor modification to Session-8
</commit_message>
<xml_diff>
--- a/fundamentals/Session-8.pptx
+++ b/fundamentals/Session-8.pptx
@@ -216,7 +216,7 @@
           <a:p>
             <a:fld id="{720C9186-47A3-C54A-A8AF-47B660C0099D}" type="datetimeFigureOut">
               <a:rPr lang="en-US" smtClean="0"/>
-              <a:t>5/28/20</a:t>
+              <a:t>6/5/20</a:t>
             </a:fld>
             <a:endParaRPr lang="en-US"/>
           </a:p>
@@ -946,7 +946,7 @@
           <a:p>
             <a:fld id="{4AAD347D-5ACD-4C99-B74B-A9C85AD731AF}" type="datetimeFigureOut">
               <a:rPr lang="en-US" smtClean="0"/>
-              <a:t>5/28/20</a:t>
+              <a:t>6/5/20</a:t>
             </a:fld>
             <a:endParaRPr lang="en-US" dirty="0"/>
           </a:p>
@@ -1148,7 +1148,7 @@
           <a:p>
             <a:fld id="{4AAD347D-5ACD-4C99-B74B-A9C85AD731AF}" type="datetimeFigureOut">
               <a:rPr lang="en-US" smtClean="0"/>
-              <a:t>5/28/20</a:t>
+              <a:t>6/5/20</a:t>
             </a:fld>
             <a:endParaRPr lang="en-US" dirty="0"/>
           </a:p>
@@ -1329,7 +1329,7 @@
           <a:p>
             <a:fld id="{4AAD347D-5ACD-4C99-B74B-A9C85AD731AF}" type="datetimeFigureOut">
               <a:rPr lang="en-US" smtClean="0"/>
-              <a:t>5/28/20</a:t>
+              <a:t>6/5/20</a:t>
             </a:fld>
             <a:endParaRPr lang="en-US" dirty="0"/>
           </a:p>
@@ -1500,7 +1500,7 @@
           <a:p>
             <a:fld id="{4AAD347D-5ACD-4C99-B74B-A9C85AD731AF}" type="datetimeFigureOut">
               <a:rPr lang="en-US" smtClean="0"/>
-              <a:t>5/28/20</a:t>
+              <a:t>6/5/20</a:t>
             </a:fld>
             <a:endParaRPr lang="en-US" dirty="0"/>
           </a:p>
@@ -2072,7 +2072,7 @@
           <a:p>
             <a:fld id="{9796027F-7875-4030-9381-8BD8C4F21935}" type="datetimeFigureOut">
               <a:rPr lang="en-US" smtClean="0"/>
-              <a:t>5/28/20</a:t>
+              <a:t>6/5/20</a:t>
             </a:fld>
             <a:endParaRPr lang="en-US" dirty="0"/>
           </a:p>
@@ -2374,7 +2374,7 @@
           <a:p>
             <a:fld id="{4AAD347D-5ACD-4C99-B74B-A9C85AD731AF}" type="datetimeFigureOut">
               <a:rPr lang="en-US" smtClean="0"/>
-              <a:t>5/28/20</a:t>
+              <a:t>6/5/20</a:t>
             </a:fld>
             <a:endParaRPr lang="en-US" dirty="0"/>
           </a:p>
@@ -2817,7 +2817,7 @@
           <a:p>
             <a:fld id="{4AAD347D-5ACD-4C99-B74B-A9C85AD731AF}" type="datetimeFigureOut">
               <a:rPr lang="en-US" smtClean="0"/>
-              <a:t>5/28/20</a:t>
+              <a:t>6/5/20</a:t>
             </a:fld>
             <a:endParaRPr lang="en-US" dirty="0"/>
           </a:p>
@@ -2936,7 +2936,7 @@
           <a:p>
             <a:fld id="{4509A250-FF31-4206-8172-F9D3106AACB1}" type="datetimeFigureOut">
               <a:rPr lang="en-US" smtClean="0"/>
-              <a:t>5/28/20</a:t>
+              <a:t>6/5/20</a:t>
             </a:fld>
             <a:endParaRPr lang="en-US" dirty="0"/>
           </a:p>
@@ -3031,7 +3031,7 @@
           <a:p>
             <a:fld id="{4509A250-FF31-4206-8172-F9D3106AACB1}" type="datetimeFigureOut">
               <a:rPr lang="en-US" smtClean="0"/>
-              <a:t>5/28/20</a:t>
+              <a:t>6/5/20</a:t>
             </a:fld>
             <a:endParaRPr lang="en-US" dirty="0"/>
           </a:p>
@@ -3413,7 +3413,7 @@
           <a:p>
             <a:fld id="{4AAD347D-5ACD-4C99-B74B-A9C85AD731AF}" type="datetimeFigureOut">
               <a:rPr lang="en-US" smtClean="0"/>
-              <a:t>5/28/20</a:t>
+              <a:t>6/5/20</a:t>
             </a:fld>
             <a:endParaRPr lang="en-US" dirty="0"/>
           </a:p>
@@ -3813,7 +3813,7 @@
           <a:p>
             <a:fld id="{4509A250-FF31-4206-8172-F9D3106AACB1}" type="datetimeFigureOut">
               <a:rPr lang="en-US" smtClean="0"/>
-              <a:t>5/28/20</a:t>
+              <a:t>6/5/20</a:t>
             </a:fld>
             <a:endParaRPr lang="en-US" dirty="0"/>
           </a:p>
@@ -4126,7 +4126,7 @@
           <a:p>
             <a:fld id="{4AAD347D-5ACD-4C99-B74B-A9C85AD731AF}" type="datetimeFigureOut">
               <a:rPr lang="en-US" smtClean="0"/>
-              <a:t>5/28/20</a:t>
+              <a:t>6/5/20</a:t>
             </a:fld>
             <a:endParaRPr lang="en-US" dirty="0"/>
           </a:p>
@@ -9390,7 +9390,7 @@
           </a:p>
           <a:p>
             <a:r>
-              <a:rPr lang="en-US" i="1" dirty="0">
+              <a:rPr lang="en-US" i="1" dirty="0" err="1">
                 <a:solidFill>
                   <a:schemeClr val="tx2">
                     <a:lumMod val="75000"/>
@@ -9399,7 +9399,47 @@
                 <a:latin typeface="Consolas" panose="020B0609020204030204" pitchFamily="49" charset="0"/>
                 <a:cs typeface="Consolas" panose="020B0609020204030204" pitchFamily="49" charset="0"/>
               </a:rPr>
-              <a:t>dict	</a:t>
+              <a:t>dict</a:t>
+            </a:r>
+            <a:endParaRPr lang="en-US" i="1" dirty="0">
+              <a:solidFill>
+                <a:schemeClr val="tx2">
+                  <a:lumMod val="75000"/>
+                </a:schemeClr>
+              </a:solidFill>
+              <a:latin typeface="Consolas" panose="020B0609020204030204" pitchFamily="49" charset="0"/>
+              <a:cs typeface="Consolas" panose="020B0609020204030204" pitchFamily="49" charset="0"/>
+            </a:endParaRPr>
+          </a:p>
+          <a:p>
+            <a:r>
+              <a:rPr lang="en-US" i="1" dirty="0">
+                <a:solidFill>
+                  <a:schemeClr val="tx2">
+                    <a:lumMod val="75000"/>
+                  </a:schemeClr>
+                </a:solidFill>
+                <a:latin typeface="Consolas" panose="020B0609020204030204" pitchFamily="49" charset="0"/>
+                <a:cs typeface="Consolas" panose="020B0609020204030204" pitchFamily="49" charset="0"/>
+              </a:rPr>
+              <a:t>tuple	</a:t>
+            </a:r>
+          </a:p>
+          <a:p>
+            <a:pPr marL="0" indent="0">
+              <a:buNone/>
+            </a:pPr>
+            <a:r>
+              <a:rPr lang="en-US" i="1" dirty="0">
+                <a:solidFill>
+                  <a:schemeClr val="tx2">
+                    <a:lumMod val="75000"/>
+                  </a:schemeClr>
+                </a:solidFill>
+                <a:latin typeface="Consolas" panose="020B0609020204030204" pitchFamily="49" charset="0"/>
+                <a:cs typeface="Consolas" panose="020B0609020204030204" pitchFamily="49" charset="0"/>
+              </a:rPr>
+              <a:t>	</a:t>
             </a:r>
           </a:p>
         </p:txBody>
@@ -9729,20 +9769,6 @@
                 <a:cs typeface="Consolas" panose="020B0609020204030204" pitchFamily="49" charset="0"/>
               </a:rPr>
               <a:t>char</a:t>
-            </a:r>
-          </a:p>
-          <a:p>
-            <a:r>
-              <a:rPr lang="en-US" i="1" dirty="0">
-                <a:solidFill>
-                  <a:schemeClr val="tx2">
-                    <a:lumMod val="75000"/>
-                  </a:schemeClr>
-                </a:solidFill>
-                <a:latin typeface="Consolas" panose="020B0609020204030204" pitchFamily="49" charset="0"/>
-                <a:cs typeface="Consolas" panose="020B0609020204030204" pitchFamily="49" charset="0"/>
-              </a:rPr>
-              <a:t>tuple	</a:t>
             </a:r>
           </a:p>
         </p:txBody>
@@ -14258,27 +14284,7 @@
                   </a:schemeClr>
                 </a:solidFill>
               </a:rPr>
-              <a:t>Associative array </a:t>
-            </a:r>
-            <a:r>
-              <a:rPr lang="en-US" dirty="0" err="1">
-                <a:solidFill>
-                  <a:schemeClr val="tx2">
-                    <a:lumMod val="75000"/>
-                  </a:schemeClr>
-                </a:solidFill>
-              </a:rPr>
-              <a:t>a.k.a</a:t>
-            </a:r>
-            <a:r>
-              <a:rPr lang="en-US" dirty="0">
-                <a:solidFill>
-                  <a:schemeClr val="tx2">
-                    <a:lumMod val="75000"/>
-                  </a:schemeClr>
-                </a:solidFill>
-              </a:rPr>
-              <a:t> Dictionary</a:t>
+              <a:t>Associative array a.k.a Dictionary</a:t>
             </a:r>
           </a:p>
         </p:txBody>
@@ -15107,6 +15113,49 @@
           </a:graphicData>
         </a:graphic>
       </p:graphicFrame>
+      <p:sp>
+        <p:nvSpPr>
+          <p:cNvPr id="5" name="TextBox 4">
+            <a:extLst>
+              <a:ext uri="{FF2B5EF4-FFF2-40B4-BE49-F238E27FC236}">
+                <a16:creationId xmlns:a16="http://schemas.microsoft.com/office/drawing/2014/main" id="{D7183CEE-185E-6A4B-B1BB-07A5291F0C09}"/>
+              </a:ext>
+            </a:extLst>
+          </p:cNvPr>
+          <p:cNvSpPr txBox="1"/>
+          <p:nvPr/>
+        </p:nvSpPr>
+        <p:spPr>
+          <a:xfrm>
+            <a:off x="1419497" y="5677989"/>
+            <a:ext cx="10189008" cy="369332"/>
+          </a:xfrm>
+          <a:prstGeom prst="rect">
+            <a:avLst/>
+          </a:prstGeom>
+          <a:noFill/>
+        </p:spPr>
+        <p:txBody>
+          <a:bodyPr wrap="none" rtlCol="0">
+            <a:spAutoFit/>
+          </a:bodyPr>
+          <a:lstStyle/>
+          <a:p>
+            <a:r>
+              <a:rPr lang="en-US" dirty="0">
+                <a:solidFill>
+                  <a:schemeClr val="tx2">
+                    <a:lumMod val="75000"/>
+                  </a:schemeClr>
+                </a:solidFill>
+                <a:latin typeface="Consolas" panose="020B0609020204030204" pitchFamily="49" charset="0"/>
+                <a:cs typeface="Consolas" panose="020B0609020204030204" pitchFamily="49" charset="0"/>
+              </a:rPr>
+              <a:t># Implied relationship (association) between key and value in {key: value} item</a:t>
+            </a:r>
+          </a:p>
+        </p:txBody>
+      </p:sp>
     </p:spTree>
     <p:extLst>
       <p:ext uri="{BB962C8B-B14F-4D97-AF65-F5344CB8AC3E}">
@@ -18058,7 +18107,7 @@
         </p:nvSpPr>
         <p:spPr>
           <a:xfrm>
-            <a:off x="1175512" y="2557849"/>
+            <a:off x="1175512" y="2566558"/>
             <a:ext cx="9792208" cy="3407862"/>
           </a:xfrm>
         </p:spPr>
@@ -18069,7 +18118,7 @@
           <a:lstStyle/>
           <a:p>
             <a:r>
-              <a:rPr lang="en-US" dirty="0">
+              <a:rPr lang="en-US" dirty="0" err="1">
                 <a:solidFill>
                   <a:schemeClr val="tx2">
                     <a:lumMod val="75000"/>
@@ -18078,7 +18127,19 @@
                 <a:latin typeface="Consolas" panose="020B0609020204030204" pitchFamily="49" charset="0"/>
                 <a:cs typeface="Consolas" panose="020B0609020204030204" pitchFamily="49" charset="0"/>
               </a:rPr>
-              <a:t>dictionary[‘</a:t>
+              <a:t>dictionary_name</a:t>
+            </a:r>
+            <a:r>
+              <a:rPr lang="en-US" dirty="0">
+                <a:solidFill>
+                  <a:schemeClr val="tx2">
+                    <a:lumMod val="75000"/>
+                  </a:schemeClr>
+                </a:solidFill>
+                <a:latin typeface="Consolas" panose="020B0609020204030204" pitchFamily="49" charset="0"/>
+                <a:cs typeface="Consolas" panose="020B0609020204030204" pitchFamily="49" charset="0"/>
+              </a:rPr>
+              <a:t>[‘</a:t>
             </a:r>
             <a:r>
               <a:rPr lang="en-US" dirty="0" err="1">

</xml_diff>